<commit_message>
small changes to week 1 lecture/lab
</commit_message>
<xml_diff>
--- a/Week 1 -- Likelihoods and linear models/Lab 1/Lab 1 -- Generalized linear models.pptx
+++ b/Week 1 -- Likelihoods and linear models/Lab 1/Lab 1 -- Generalized linear models.pptx
@@ -3779,8 +3779,16 @@
           <a:lstStyle/>
           <a:p>
             <a:r>
-              <a:rPr lang="en-US" dirty="0" smtClean="0"/>
-              <a:t>March 31, 2016</a:t>
+              <a:rPr lang="en-US" smtClean="0"/>
+              <a:t>March </a:t>
+            </a:r>
+            <a:r>
+              <a:rPr lang="en-US" smtClean="0"/>
+              <a:t>29</a:t>
+            </a:r>
+            <a:r>
+              <a:rPr lang="en-US" smtClean="0"/>
+              <a:t>, 2018</a:t>
             </a:r>
             <a:endParaRPr lang="en-US" dirty="0"/>
           </a:p>

</xml_diff>